<commit_message>
add slides/exercises for test design
</commit_message>
<xml_diff>
--- a/slides/Tag1_1Vormittag_Nr1_IRT_Theorie/01_IRT_Theorie.pptx
+++ b/slides/Tag1_1Vormittag_Nr1_IRT_Theorie/01_IRT_Theorie.pptx
@@ -325,7 +325,7 @@
               <a:pPr>
                 <a:defRPr/>
               </a:pPr>
-              <a:t>06.09.2024</a:t>
+              <a:t>23.09.2024</a:t>
             </a:fld>
             <a:endParaRPr lang="de-DE"/>
           </a:p>
@@ -523,7 +523,7 @@
               <a:pPr>
                 <a:defRPr/>
               </a:pPr>
-              <a:t>06.09.2024</a:t>
+              <a:t>23.09.2024</a:t>
             </a:fld>
             <a:endParaRPr lang="de-DE"/>
           </a:p>
@@ -9801,7 +9801,7 @@
               <a:pPr>
                 <a:defRPr/>
               </a:pPr>
-              <a:t>06.09.2024</a:t>
+              <a:t>23.09.2024</a:t>
             </a:fld>
             <a:endParaRPr lang="de-DE" dirty="0"/>
           </a:p>
@@ -19267,7 +19267,7 @@
           <a:graphicData uri="http://schemas.openxmlformats.org/presentationml/2006/ole">
             <mc:AlternateContent xmlns:mc="http://schemas.openxmlformats.org/markup-compatibility/2006">
               <mc:Choice xmlns:v="urn:schemas-microsoft-com:vml" Requires="v">
-                <p:oleObj spid="_x0000_s263278" r:id="rId4" imgW="1346200" imgH="431800" progId="Equation.3">
+                <p:oleObj spid="_x0000_s263282" r:id="rId4" imgW="1346200" imgH="431800" progId="Equation.3">
                   <p:embed/>
                 </p:oleObj>
               </mc:Choice>
@@ -19418,7 +19418,7 @@
           <a:graphicData uri="http://schemas.openxmlformats.org/presentationml/2006/ole">
             <mc:AlternateContent xmlns:mc="http://schemas.openxmlformats.org/markup-compatibility/2006">
               <mc:Choice xmlns:v="urn:schemas-microsoft-com:vml" Requires="v">
-                <p:oleObj spid="_x0000_s263279" r:id="rId6" imgW="1218671" imgH="215806" progId="Equation.3">
+                <p:oleObj spid="_x0000_s263283" r:id="rId6" imgW="1218671" imgH="215806" progId="Equation.3">
                   <p:embed/>
                 </p:oleObj>
               </mc:Choice>
@@ -22424,7 +22424,7 @@
           <a:graphicData uri="http://schemas.openxmlformats.org/presentationml/2006/ole">
             <mc:AlternateContent xmlns:mc="http://schemas.openxmlformats.org/markup-compatibility/2006">
               <mc:Choice xmlns:v="urn:schemas-microsoft-com:vml" Requires="v">
-                <p:oleObj spid="_x0000_s354314" r:id="rId4" imgW="1040948" imgH="228501" progId="Equation.3">
+                <p:oleObj spid="_x0000_s354318" r:id="rId4" imgW="1040948" imgH="228501" progId="Equation.3">
                   <p:embed/>
                 </p:oleObj>
               </mc:Choice>
@@ -22506,7 +22506,7 @@
           <a:graphicData uri="http://schemas.openxmlformats.org/presentationml/2006/ole">
             <mc:AlternateContent xmlns:mc="http://schemas.openxmlformats.org/markup-compatibility/2006">
               <mc:Choice xmlns:v="urn:schemas-microsoft-com:vml" Requires="v">
-                <p:oleObj spid="_x0000_s354315" name="Formel" r:id="rId6" imgW="1638300" imgH="228600" progId="Equation.3">
+                <p:oleObj spid="_x0000_s354319" name="Formel" r:id="rId6" imgW="1638300" imgH="228600" progId="Equation.3">
                   <p:embed/>
                 </p:oleObj>
               </mc:Choice>
@@ -24789,7 +24789,7 @@
           <a:graphicData uri="http://schemas.openxmlformats.org/presentationml/2006/ole">
             <mc:AlternateContent xmlns:mc="http://schemas.openxmlformats.org/markup-compatibility/2006">
               <mc:Choice xmlns:v="urn:schemas-microsoft-com:vml" Requires="v">
-                <p:oleObj spid="_x0000_s336924" name="Formel" r:id="rId5" imgW="1638300" imgH="228600" progId="Equation.3">
+                <p:oleObj spid="_x0000_s336926" name="Formel" r:id="rId5" imgW="1638300" imgH="228600" progId="Equation.3">
                   <p:embed/>
                 </p:oleObj>
               </mc:Choice>
@@ -26801,7 +26801,7 @@
           <a:graphicData uri="http://schemas.openxmlformats.org/presentationml/2006/ole">
             <mc:AlternateContent xmlns:mc="http://schemas.openxmlformats.org/markup-compatibility/2006">
               <mc:Choice xmlns:v="urn:schemas-microsoft-com:vml" Requires="v">
-                <p:oleObj spid="_x0000_s339012" name="Formel" r:id="rId4" imgW="1650960" imgH="228600" progId="Equation.3">
+                <p:oleObj spid="_x0000_s339018" name="Formel" r:id="rId4" imgW="1650960" imgH="228600" progId="Equation.3">
                   <p:embed/>
                 </p:oleObj>
               </mc:Choice>
@@ -26884,7 +26884,7 @@
           <a:graphicData uri="http://schemas.openxmlformats.org/presentationml/2006/ole">
             <mc:AlternateContent xmlns:mc="http://schemas.openxmlformats.org/markup-compatibility/2006">
               <mc:Choice xmlns:v="urn:schemas-microsoft-com:vml" Requires="v">
-                <p:oleObj spid="_x0000_s339013" name="Formel" r:id="rId6" imgW="1041120" imgH="215640" progId="Equation.3">
+                <p:oleObj spid="_x0000_s339019" name="Formel" r:id="rId6" imgW="1041120" imgH="215640" progId="Equation.3">
                   <p:embed/>
                 </p:oleObj>
               </mc:Choice>
@@ -26967,7 +26967,7 @@
           <a:graphicData uri="http://schemas.openxmlformats.org/presentationml/2006/ole">
             <mc:AlternateContent xmlns:mc="http://schemas.openxmlformats.org/markup-compatibility/2006">
               <mc:Choice xmlns:v="urn:schemas-microsoft-com:vml" Requires="v">
-                <p:oleObj spid="_x0000_s339014" name="Formel" r:id="rId8" imgW="2628720" imgH="241200" progId="Equation.3">
+                <p:oleObj spid="_x0000_s339020" name="Formel" r:id="rId8" imgW="2628720" imgH="241200" progId="Equation.3">
                   <p:embed/>
                 </p:oleObj>
               </mc:Choice>
@@ -39891,6 +39891,75 @@
             <a:endParaRPr lang="en-US" altLang="de-DE" sz="1400" dirty="0">
               <a:latin typeface="Calibri" pitchFamily="34" charset="0"/>
             </a:endParaRPr>
+          </a:p>
+          <a:p>
+            <a:pPr lvl="1">
+              <a:lnSpc>
+                <a:spcPct val="114000"/>
+              </a:lnSpc>
+              <a:spcBef>
+                <a:spcPts val="600"/>
+              </a:spcBef>
+              <a:buClr>
+                <a:srgbClr val="A61B1E"/>
+              </a:buClr>
+              <a:buFontTx/>
+              <a:buChar char="–"/>
+            </a:pPr>
+            <a:r>
+              <a:rPr lang="en-US" altLang="de-DE" sz="1400" b="1" dirty="0" err="1">
+                <a:latin typeface="Calibri" pitchFamily="34" charset="0"/>
+              </a:rPr>
+              <a:t>Gütekriterien</a:t>
+            </a:r>
+            <a:r>
+              <a:rPr lang="en-US" altLang="de-DE" sz="1400" b="1" dirty="0">
+                <a:latin typeface="Calibri" pitchFamily="34" charset="0"/>
+              </a:rPr>
+              <a:t>:</a:t>
+            </a:r>
+            <a:r>
+              <a:rPr lang="en-US" altLang="de-DE" sz="1400" dirty="0">
+                <a:latin typeface="Calibri" pitchFamily="34" charset="0"/>
+              </a:rPr>
+              <a:t> </a:t>
+            </a:r>
+            <a:r>
+              <a:rPr lang="en-US" altLang="de-DE" sz="1400" dirty="0" err="1">
+                <a:latin typeface="Calibri" pitchFamily="34" charset="0"/>
+              </a:rPr>
+              <a:t>Objektivität</a:t>
+            </a:r>
+            <a:r>
+              <a:rPr lang="en-US" altLang="de-DE" sz="1400" dirty="0">
+                <a:latin typeface="Calibri" pitchFamily="34" charset="0"/>
+              </a:rPr>
+              <a:t>, </a:t>
+            </a:r>
+            <a:r>
+              <a:rPr lang="en-US" altLang="de-DE" sz="1400" dirty="0" err="1">
+                <a:latin typeface="Calibri" pitchFamily="34" charset="0"/>
+              </a:rPr>
+              <a:t>Reliabilität</a:t>
+            </a:r>
+            <a:r>
+              <a:rPr lang="en-US" altLang="de-DE" sz="1400" dirty="0">
+                <a:latin typeface="Calibri" pitchFamily="34" charset="0"/>
+              </a:rPr>
+              <a:t>, </a:t>
+            </a:r>
+            <a:r>
+              <a:rPr lang="en-US" altLang="de-DE" sz="1400" dirty="0" err="1">
+                <a:latin typeface="Calibri" pitchFamily="34" charset="0"/>
+              </a:rPr>
+              <a:t>Validität</a:t>
+            </a:r>
+            <a:r>
+              <a:rPr lang="en-US" altLang="de-DE" sz="1400" dirty="0">
+                <a:latin typeface="Calibri" pitchFamily="34" charset="0"/>
+              </a:rPr>
+              <a:t>, Fairness</a:t>
+            </a:r>
           </a:p>
           <a:p>
             <a:pPr>

</xml_diff>